<commit_message>
Update the url github.
</commit_message>
<xml_diff>
--- a/KeyNotes/KeyNotePeopleLoader/KeyNotePeopleLoader/Patterns.pptx
+++ b/KeyNotes/KeyNotePeopleLoader/KeyNotePeopleLoader/Patterns.pptx
@@ -292,7 +292,7 @@
     </p:spTree>
     <p:extLst>
       <p:ext uri="{BB962C8B-B14F-4D97-AF65-F5344CB8AC3E}">
-        <p14:creationId xmlns:p14="http://schemas.microsoft.com/office/powerpoint/2010/main" xmlns="" val="4271552008"/>
+        <p14:creationId xmlns="" xmlns:p14="http://schemas.microsoft.com/office/powerpoint/2010/main" val="4271552008"/>
       </p:ext>
     </p:extLst>
   </p:cSld>
@@ -412,7 +412,7 @@
             <a:fld id="{36DBAB12-79EE-4C4A-9A9C-24CFDD55524B}" type="datetimeFigureOut">
               <a:rPr lang="ca-ES" smtClean="0"/>
               <a:pPr/>
-              <a:t>30/12/2011</a:t>
+              <a:t>12/01/2012</a:t>
             </a:fld>
             <a:endParaRPr lang="ca-ES"/>
           </a:p>
@@ -464,7 +464,7 @@
     </p:spTree>
     <p:extLst>
       <p:ext uri="{BB962C8B-B14F-4D97-AF65-F5344CB8AC3E}">
-        <p14:creationId xmlns:p14="http://schemas.microsoft.com/office/powerpoint/2010/main" xmlns="" val="921474581"/>
+        <p14:creationId xmlns="" xmlns:p14="http://schemas.microsoft.com/office/powerpoint/2010/main" val="921474581"/>
       </p:ext>
     </p:extLst>
   </p:cSld>
@@ -594,7 +594,7 @@
             <a:fld id="{36DBAB12-79EE-4C4A-9A9C-24CFDD55524B}" type="datetimeFigureOut">
               <a:rPr lang="ca-ES" smtClean="0"/>
               <a:pPr/>
-              <a:t>30/12/2011</a:t>
+              <a:t>12/01/2012</a:t>
             </a:fld>
             <a:endParaRPr lang="ca-ES"/>
           </a:p>
@@ -646,7 +646,7 @@
     </p:spTree>
     <p:extLst>
       <p:ext uri="{BB962C8B-B14F-4D97-AF65-F5344CB8AC3E}">
-        <p14:creationId xmlns:p14="http://schemas.microsoft.com/office/powerpoint/2010/main" xmlns="" val="3092195902"/>
+        <p14:creationId xmlns="" xmlns:p14="http://schemas.microsoft.com/office/powerpoint/2010/main" val="3092195902"/>
       </p:ext>
     </p:extLst>
   </p:cSld>
@@ -1086,7 +1086,7 @@
           <a:blip r:embed="rId2" cstate="print">
             <a:extLst>
               <a:ext uri="{28A0092B-C50C-407E-A947-70E740481C1C}">
-                <a14:useLocalDpi xmlns:a14="http://schemas.microsoft.com/office/drawing/2010/main" xmlns="" val="0"/>
+                <a14:useLocalDpi xmlns="" xmlns:a14="http://schemas.microsoft.com/office/drawing/2010/main" val="0"/>
               </a:ext>
             </a:extLst>
           </a:blip>
@@ -1104,7 +1104,7 @@
           <a:noFill/>
           <a:extLst>
             <a:ext uri="{909E8E84-426E-40DD-AFC4-6F175D3DCCD1}">
-              <a14:hiddenFill xmlns:a14="http://schemas.microsoft.com/office/drawing/2010/main" xmlns="">
+              <a14:hiddenFill xmlns="" xmlns:a14="http://schemas.microsoft.com/office/drawing/2010/main">
                 <a:solidFill>
                   <a:srgbClr val="FFFFFF"/>
                 </a:solidFill>
@@ -1125,7 +1125,7 @@
           <a:blip r:embed="rId3" cstate="print">
             <a:extLst>
               <a:ext uri="{28A0092B-C50C-407E-A947-70E740481C1C}">
-                <a14:useLocalDpi xmlns:a14="http://schemas.microsoft.com/office/drawing/2010/main" xmlns="" val="0"/>
+                <a14:useLocalDpi xmlns="" xmlns:a14="http://schemas.microsoft.com/office/drawing/2010/main" val="0"/>
               </a:ext>
             </a:extLst>
           </a:blip>
@@ -1145,7 +1145,7 @@
           <a:noFill/>
           <a:extLst>
             <a:ext uri="{909E8E84-426E-40DD-AFC4-6F175D3DCCD1}">
-              <a14:hiddenFill xmlns:a14="http://schemas.microsoft.com/office/drawing/2010/main" xmlns="">
+              <a14:hiddenFill xmlns="" xmlns:a14="http://schemas.microsoft.com/office/drawing/2010/main">
                 <a:solidFill>
                   <a:srgbClr val="FFFFFF"/>
                 </a:solidFill>
@@ -1166,7 +1166,7 @@
           <a:blip r:embed="rId4" cstate="print">
             <a:extLst>
               <a:ext uri="{28A0092B-C50C-407E-A947-70E740481C1C}">
-                <a14:useLocalDpi xmlns:a14="http://schemas.microsoft.com/office/drawing/2010/main" xmlns="" val="0"/>
+                <a14:useLocalDpi xmlns="" xmlns:a14="http://schemas.microsoft.com/office/drawing/2010/main" val="0"/>
               </a:ext>
             </a:extLst>
           </a:blip>
@@ -1184,7 +1184,7 @@
           <a:noFill/>
           <a:extLst>
             <a:ext uri="{909E8E84-426E-40DD-AFC4-6F175D3DCCD1}">
-              <a14:hiddenFill xmlns:a14="http://schemas.microsoft.com/office/drawing/2010/main" xmlns="">
+              <a14:hiddenFill xmlns="" xmlns:a14="http://schemas.microsoft.com/office/drawing/2010/main">
                 <a:solidFill>
                   <a:srgbClr val="FFFFFF"/>
                 </a:solidFill>
@@ -1241,7 +1241,7 @@
     </p:spTree>
     <p:extLst>
       <p:ext uri="{BB962C8B-B14F-4D97-AF65-F5344CB8AC3E}">
-        <p14:creationId xmlns:p14="http://schemas.microsoft.com/office/powerpoint/2010/main" xmlns="" val="385698145"/>
+        <p14:creationId xmlns="" xmlns:p14="http://schemas.microsoft.com/office/powerpoint/2010/main" val="385698145"/>
       </p:ext>
     </p:extLst>
   </p:cSld>
@@ -1437,7 +1437,7 @@
             <a:fld id="{36DBAB12-79EE-4C4A-9A9C-24CFDD55524B}" type="datetimeFigureOut">
               <a:rPr lang="ca-ES" smtClean="0"/>
               <a:pPr/>
-              <a:t>30/12/2011</a:t>
+              <a:t>12/01/2012</a:t>
             </a:fld>
             <a:endParaRPr lang="ca-ES"/>
           </a:p>
@@ -1489,7 +1489,7 @@
     </p:spTree>
     <p:extLst>
       <p:ext uri="{BB962C8B-B14F-4D97-AF65-F5344CB8AC3E}">
-        <p14:creationId xmlns:p14="http://schemas.microsoft.com/office/powerpoint/2010/main" xmlns="" val="1424523742"/>
+        <p14:creationId xmlns="" xmlns:p14="http://schemas.microsoft.com/office/powerpoint/2010/main" val="1424523742"/>
       </p:ext>
     </p:extLst>
   </p:cSld>
@@ -1727,7 +1727,7 @@
             <a:fld id="{36DBAB12-79EE-4C4A-9A9C-24CFDD55524B}" type="datetimeFigureOut">
               <a:rPr lang="ca-ES" smtClean="0"/>
               <a:pPr/>
-              <a:t>30/12/2011</a:t>
+              <a:t>12/01/2012</a:t>
             </a:fld>
             <a:endParaRPr lang="ca-ES"/>
           </a:p>
@@ -1779,7 +1779,7 @@
     </p:spTree>
     <p:extLst>
       <p:ext uri="{BB962C8B-B14F-4D97-AF65-F5344CB8AC3E}">
-        <p14:creationId xmlns:p14="http://schemas.microsoft.com/office/powerpoint/2010/main" xmlns="" val="3455047724"/>
+        <p14:creationId xmlns="" xmlns:p14="http://schemas.microsoft.com/office/powerpoint/2010/main" val="3455047724"/>
       </p:ext>
     </p:extLst>
   </p:cSld>
@@ -2151,7 +2151,7 @@
             <a:fld id="{36DBAB12-79EE-4C4A-9A9C-24CFDD55524B}" type="datetimeFigureOut">
               <a:rPr lang="ca-ES" smtClean="0"/>
               <a:pPr/>
-              <a:t>30/12/2011</a:t>
+              <a:t>12/01/2012</a:t>
             </a:fld>
             <a:endParaRPr lang="ca-ES"/>
           </a:p>
@@ -2203,7 +2203,7 @@
     </p:spTree>
     <p:extLst>
       <p:ext uri="{BB962C8B-B14F-4D97-AF65-F5344CB8AC3E}">
-        <p14:creationId xmlns:p14="http://schemas.microsoft.com/office/powerpoint/2010/main" xmlns="" val="3843878020"/>
+        <p14:creationId xmlns="" xmlns:p14="http://schemas.microsoft.com/office/powerpoint/2010/main" val="3843878020"/>
       </p:ext>
     </p:extLst>
   </p:cSld>
@@ -2271,7 +2271,7 @@
             <a:fld id="{36DBAB12-79EE-4C4A-9A9C-24CFDD55524B}" type="datetimeFigureOut">
               <a:rPr lang="ca-ES" smtClean="0"/>
               <a:pPr/>
-              <a:t>30/12/2011</a:t>
+              <a:t>12/01/2012</a:t>
             </a:fld>
             <a:endParaRPr lang="ca-ES"/>
           </a:p>
@@ -2323,7 +2323,7 @@
     </p:spTree>
     <p:extLst>
       <p:ext uri="{BB962C8B-B14F-4D97-AF65-F5344CB8AC3E}">
-        <p14:creationId xmlns:p14="http://schemas.microsoft.com/office/powerpoint/2010/main" xmlns="" val="1404892992"/>
+        <p14:creationId xmlns="" xmlns:p14="http://schemas.microsoft.com/office/powerpoint/2010/main" val="1404892992"/>
       </p:ext>
     </p:extLst>
   </p:cSld>
@@ -2368,7 +2368,7 @@
             <a:fld id="{36DBAB12-79EE-4C4A-9A9C-24CFDD55524B}" type="datetimeFigureOut">
               <a:rPr lang="ca-ES" smtClean="0"/>
               <a:pPr/>
-              <a:t>30/12/2011</a:t>
+              <a:t>12/01/2012</a:t>
             </a:fld>
             <a:endParaRPr lang="ca-ES"/>
           </a:p>
@@ -2420,7 +2420,7 @@
     </p:spTree>
     <p:extLst>
       <p:ext uri="{BB962C8B-B14F-4D97-AF65-F5344CB8AC3E}">
-        <p14:creationId xmlns:p14="http://schemas.microsoft.com/office/powerpoint/2010/main" xmlns="" val="4153756955"/>
+        <p14:creationId xmlns="" xmlns:p14="http://schemas.microsoft.com/office/powerpoint/2010/main" val="4153756955"/>
       </p:ext>
     </p:extLst>
   </p:cSld>
@@ -2647,7 +2647,7 @@
             <a:fld id="{36DBAB12-79EE-4C4A-9A9C-24CFDD55524B}" type="datetimeFigureOut">
               <a:rPr lang="ca-ES" smtClean="0"/>
               <a:pPr/>
-              <a:t>30/12/2011</a:t>
+              <a:t>12/01/2012</a:t>
             </a:fld>
             <a:endParaRPr lang="ca-ES"/>
           </a:p>
@@ -2699,7 +2699,7 @@
     </p:spTree>
     <p:extLst>
       <p:ext uri="{BB962C8B-B14F-4D97-AF65-F5344CB8AC3E}">
-        <p14:creationId xmlns:p14="http://schemas.microsoft.com/office/powerpoint/2010/main" xmlns="" val="1399893095"/>
+        <p14:creationId xmlns="" xmlns:p14="http://schemas.microsoft.com/office/powerpoint/2010/main" val="1399893095"/>
       </p:ext>
     </p:extLst>
   </p:cSld>
@@ -2902,7 +2902,7 @@
             <a:fld id="{36DBAB12-79EE-4C4A-9A9C-24CFDD55524B}" type="datetimeFigureOut">
               <a:rPr lang="ca-ES" smtClean="0"/>
               <a:pPr/>
-              <a:t>30/12/2011</a:t>
+              <a:t>12/01/2012</a:t>
             </a:fld>
             <a:endParaRPr lang="ca-ES"/>
           </a:p>
@@ -2954,7 +2954,7 @@
     </p:spTree>
     <p:extLst>
       <p:ext uri="{BB962C8B-B14F-4D97-AF65-F5344CB8AC3E}">
-        <p14:creationId xmlns:p14="http://schemas.microsoft.com/office/powerpoint/2010/main" xmlns="" val="3500550884"/>
+        <p14:creationId xmlns="" xmlns:p14="http://schemas.microsoft.com/office/powerpoint/2010/main" val="3500550884"/>
       </p:ext>
     </p:extLst>
   </p:cSld>
@@ -3117,7 +3117,7 @@
             <a:fld id="{36DBAB12-79EE-4C4A-9A9C-24CFDD55524B}" type="datetimeFigureOut">
               <a:rPr lang="ca-ES" smtClean="0"/>
               <a:pPr/>
-              <a:t>30/12/2011</a:t>
+              <a:t>12/01/2012</a:t>
             </a:fld>
             <a:endParaRPr lang="ca-ES"/>
           </a:p>
@@ -3205,7 +3205,7 @@
     </p:spTree>
     <p:extLst>
       <p:ext uri="{BB962C8B-B14F-4D97-AF65-F5344CB8AC3E}">
-        <p14:creationId xmlns:p14="http://schemas.microsoft.com/office/powerpoint/2010/main" xmlns="" val="4102418262"/>
+        <p14:creationId xmlns="" xmlns:p14="http://schemas.microsoft.com/office/powerpoint/2010/main" val="4102418262"/>
       </p:ext>
     </p:extLst>
   </p:cSld>
@@ -3523,10 +3523,6 @@
               <a:rPr lang="ca-ES" sz="7800" b="1" dirty="0" smtClean="0"/>
               <a:t> II</a:t>
             </a:r>
-            <a:r>
-              <a:rPr lang="ca-ES" sz="7800" b="1" dirty="0" smtClean="0"/>
-              <a:t/>
-            </a:r>
             <a:br>
               <a:rPr lang="ca-ES" sz="7800" b="1" dirty="0" smtClean="0"/>
             </a:br>
@@ -3551,17 +3547,6 @@
                 </a:solidFill>
               </a:rPr>
               <a:t> ...</a:t>
-            </a:r>
-            <a:r>
-              <a:rPr lang="ca-ES" dirty="0" smtClean="0">
-                <a:solidFill>
-                  <a:schemeClr val="bg1">
-                    <a:lumMod val="50000"/>
-                    <a:lumOff val="50000"/>
-                  </a:schemeClr>
-                </a:solidFill>
-              </a:rPr>
-              <a:t/>
             </a:r>
             <a:br>
               <a:rPr lang="ca-ES" dirty="0" smtClean="0">
@@ -3775,7 +3760,7 @@
         <p:spPr>
           <a:xfrm>
             <a:off x="1907704" y="4581128"/>
-            <a:ext cx="6048672" cy="646331"/>
+            <a:ext cx="6048672" cy="1200329"/>
           </a:xfrm>
           <a:prstGeom prst="rect">
             <a:avLst/>
@@ -3791,8 +3776,32 @@
             <a:pPr algn="r"/>
             <a:r>
               <a:rPr lang="es-ES" dirty="0" smtClean="0"/>
-              <a:t>Luis G. Rodríguez</a:t>
-            </a:r>
+              <a:t>Luis G. </a:t>
+            </a:r>
+            <a:r>
+              <a:rPr lang="es-ES" dirty="0" smtClean="0"/>
+              <a:t>Rodríguez</a:t>
+            </a:r>
+          </a:p>
+          <a:p>
+            <a:pPr algn="r"/>
+            <a:r>
+              <a:rPr lang="es-ES" dirty="0" err="1" smtClean="0"/>
+              <a:t>Github</a:t>
+            </a:r>
+            <a:r>
+              <a:rPr lang="es-ES" dirty="0" smtClean="0"/>
+              <a:t>: https://</a:t>
+            </a:r>
+            <a:r>
+              <a:rPr lang="es-ES" smtClean="0"/>
+              <a:t>github.com/seymourpoler</a:t>
+            </a:r>
+            <a:r>
+              <a:rPr lang="es-ES" smtClean="0"/>
+              <a:t>/</a:t>
+            </a:r>
+            <a:endParaRPr lang="es-ES" dirty="0" smtClean="0"/>
           </a:p>
           <a:p>
             <a:pPr algn="r"/>
@@ -3800,6 +3809,9 @@
               <a:rPr lang="es-ES" dirty="0" smtClean="0"/>
               <a:t>lgrodrigueza@Team-pro.es</a:t>
             </a:r>
+          </a:p>
+          <a:p>
+            <a:pPr algn="r"/>
             <a:endParaRPr lang="es-ES" dirty="0"/>
           </a:p>
         </p:txBody>
@@ -3807,7 +3819,7 @@
     </p:spTree>
     <p:extLst>
       <p:ext uri="{BB962C8B-B14F-4D97-AF65-F5344CB8AC3E}">
-        <p14:creationId xmlns:p14="http://schemas.microsoft.com/office/powerpoint/2010/main" xmlns="" val="1572434489"/>
+        <p14:creationId xmlns="" xmlns:p14="http://schemas.microsoft.com/office/powerpoint/2010/main" val="1572434489"/>
       </p:ext>
     </p:extLst>
   </p:cSld>
@@ -4044,11 +4056,7 @@
           <a:p>
             <a:r>
               <a:rPr lang="es-ES" dirty="0" smtClean="0"/>
-              <a:t>* http</a:t>
-            </a:r>
-            <a:r>
-              <a:rPr lang="es-ES" dirty="0" smtClean="0"/>
-              <a:t>://www.paulgraham.com/hp.html</a:t>
+              <a:t>* http://www.paulgraham.com/hp.html</a:t>
             </a:r>
             <a:endParaRPr lang="es-ES" dirty="0"/>
           </a:p>
@@ -4089,7 +4097,7 @@
     </p:spTree>
     <p:extLst>
       <p:ext uri="{BB962C8B-B14F-4D97-AF65-F5344CB8AC3E}">
-        <p14:creationId xmlns:p14="http://schemas.microsoft.com/office/powerpoint/2010/main" xmlns="" val="1078402712"/>
+        <p14:creationId xmlns="" xmlns:p14="http://schemas.microsoft.com/office/powerpoint/2010/main" val="1078402712"/>
       </p:ext>
     </p:extLst>
   </p:cSld>
@@ -4208,7 +4216,7 @@
     </p:spTree>
     <p:extLst>
       <p:ext uri="{BB962C8B-B14F-4D97-AF65-F5344CB8AC3E}">
-        <p14:creationId xmlns:p14="http://schemas.microsoft.com/office/powerpoint/2010/main" xmlns="" val="3051111745"/>
+        <p14:creationId xmlns="" xmlns:p14="http://schemas.microsoft.com/office/powerpoint/2010/main" val="3051111745"/>
       </p:ext>
     </p:extLst>
   </p:cSld>
@@ -4422,7 +4430,7 @@
     </p:spTree>
     <p:extLst>
       <p:ext uri="{BB962C8B-B14F-4D97-AF65-F5344CB8AC3E}">
-        <p14:creationId xmlns:p14="http://schemas.microsoft.com/office/powerpoint/2010/main" xmlns="" val="3051111745"/>
+        <p14:creationId xmlns="" xmlns:p14="http://schemas.microsoft.com/office/powerpoint/2010/main" val="3051111745"/>
       </p:ext>
     </p:extLst>
   </p:cSld>
@@ -4645,7 +4653,7 @@
     </p:spTree>
     <p:extLst>
       <p:ext uri="{BB962C8B-B14F-4D97-AF65-F5344CB8AC3E}">
-        <p14:creationId xmlns:p14="http://schemas.microsoft.com/office/powerpoint/2010/main" xmlns="" val="3051111745"/>
+        <p14:creationId xmlns="" xmlns:p14="http://schemas.microsoft.com/office/powerpoint/2010/main" val="3051111745"/>
       </p:ext>
     </p:extLst>
   </p:cSld>
@@ -4731,7 +4739,7 @@
     </p:spTree>
     <p:extLst>
       <p:ext uri="{BB962C8B-B14F-4D97-AF65-F5344CB8AC3E}">
-        <p14:creationId xmlns:p14="http://schemas.microsoft.com/office/powerpoint/2010/main" xmlns="" val="3051111745"/>
+        <p14:creationId xmlns="" xmlns:p14="http://schemas.microsoft.com/office/powerpoint/2010/main" val="3051111745"/>
       </p:ext>
     </p:extLst>
   </p:cSld>
@@ -4826,7 +4834,7 @@
     </p:spTree>
     <p:extLst>
       <p:ext uri="{BB962C8B-B14F-4D97-AF65-F5344CB8AC3E}">
-        <p14:creationId xmlns:p14="http://schemas.microsoft.com/office/powerpoint/2010/main" xmlns="" val="3051111745"/>
+        <p14:creationId xmlns="" xmlns:p14="http://schemas.microsoft.com/office/powerpoint/2010/main" val="3051111745"/>
       </p:ext>
     </p:extLst>
   </p:cSld>
@@ -5402,7 +5410,7 @@
     </p:spTree>
     <p:extLst>
       <p:ext uri="{BB962C8B-B14F-4D97-AF65-F5344CB8AC3E}">
-        <p14:creationId xmlns:p14="http://schemas.microsoft.com/office/powerpoint/2010/main" xmlns="" val="3051111745"/>
+        <p14:creationId xmlns="" xmlns:p14="http://schemas.microsoft.com/office/powerpoint/2010/main" val="3051111745"/>
       </p:ext>
     </p:extLst>
   </p:cSld>

</xml_diff>